<commit_message>
export, headless build, update site
</commit_message>
<xml_diff>
--- a/src/slides.pptx
+++ b/src/slides.pptx
@@ -7,6 +7,8 @@
   <p:sldIdLst>
     <p:sldId id="259" r:id="rId2"/>
     <p:sldId id="260" r:id="rId3"/>
+    <p:sldId id="261" r:id="rId4"/>
+    <p:sldId id="263" r:id="rId5"/>
   </p:sldIdLst>
   <p:sldSz cx="9144000" cy="6858000" type="screen4x3"/>
   <p:notesSz cx="6858000" cy="9144000"/>
@@ -289,9 +291,9 @@
           <a:p>
             <a:fld id="{FCD849ED-D095-4409-898A-E3F8B21476F0}" type="datetimeFigureOut">
               <a:rPr lang="en-US" smtClean="0"/>
-              <a:t>7/26/2011</a:t>
+              <a:t>8/2/2011</a:t>
             </a:fld>
-            <a:endParaRPr lang="en-US"/>
+            <a:endParaRPr lang="en-US" dirty="0"/>
           </a:p>
         </p:txBody>
       </p:sp>
@@ -310,7 +312,7 @@
           <a:bodyPr/>
           <a:lstStyle/>
           <a:p>
-            <a:endParaRPr lang="en-US"/>
+            <a:endParaRPr lang="en-US" dirty="0"/>
           </a:p>
         </p:txBody>
       </p:sp>
@@ -333,7 +335,7 @@
               <a:rPr lang="en-US" smtClean="0"/>
               <a:t>‹#›</a:t>
             </a:fld>
-            <a:endParaRPr lang="en-US"/>
+            <a:endParaRPr lang="en-US" dirty="0"/>
           </a:p>
         </p:txBody>
       </p:sp>
@@ -459,9 +461,9 @@
           <a:p>
             <a:fld id="{FCD849ED-D095-4409-898A-E3F8B21476F0}" type="datetimeFigureOut">
               <a:rPr lang="en-US" smtClean="0"/>
-              <a:t>7/26/2011</a:t>
+              <a:t>8/2/2011</a:t>
             </a:fld>
-            <a:endParaRPr lang="en-US"/>
+            <a:endParaRPr lang="en-US" dirty="0"/>
           </a:p>
         </p:txBody>
       </p:sp>
@@ -480,7 +482,7 @@
           <a:bodyPr/>
           <a:lstStyle/>
           <a:p>
-            <a:endParaRPr lang="en-US"/>
+            <a:endParaRPr lang="en-US" dirty="0"/>
           </a:p>
         </p:txBody>
       </p:sp>
@@ -503,7 +505,7 @@
               <a:rPr lang="en-US" smtClean="0"/>
               <a:t>‹#›</a:t>
             </a:fld>
-            <a:endParaRPr lang="en-US"/>
+            <a:endParaRPr lang="en-US" dirty="0"/>
           </a:p>
         </p:txBody>
       </p:sp>
@@ -639,9 +641,9 @@
           <a:p>
             <a:fld id="{FCD849ED-D095-4409-898A-E3F8B21476F0}" type="datetimeFigureOut">
               <a:rPr lang="en-US" smtClean="0"/>
-              <a:t>7/26/2011</a:t>
+              <a:t>8/2/2011</a:t>
             </a:fld>
-            <a:endParaRPr lang="en-US"/>
+            <a:endParaRPr lang="en-US" dirty="0"/>
           </a:p>
         </p:txBody>
       </p:sp>
@@ -660,7 +662,7 @@
           <a:bodyPr/>
           <a:lstStyle/>
           <a:p>
-            <a:endParaRPr lang="en-US"/>
+            <a:endParaRPr lang="en-US" dirty="0"/>
           </a:p>
         </p:txBody>
       </p:sp>
@@ -683,7 +685,7 @@
               <a:rPr lang="en-US" smtClean="0"/>
               <a:t>‹#›</a:t>
             </a:fld>
-            <a:endParaRPr lang="en-US"/>
+            <a:endParaRPr lang="en-US" dirty="0"/>
           </a:p>
         </p:txBody>
       </p:sp>
@@ -809,9 +811,9 @@
           <a:p>
             <a:fld id="{FCD849ED-D095-4409-898A-E3F8B21476F0}" type="datetimeFigureOut">
               <a:rPr lang="en-US" smtClean="0"/>
-              <a:t>7/26/2011</a:t>
+              <a:t>8/2/2011</a:t>
             </a:fld>
-            <a:endParaRPr lang="en-US"/>
+            <a:endParaRPr lang="en-US" dirty="0"/>
           </a:p>
         </p:txBody>
       </p:sp>
@@ -830,7 +832,7 @@
           <a:bodyPr/>
           <a:lstStyle/>
           <a:p>
-            <a:endParaRPr lang="en-US"/>
+            <a:endParaRPr lang="en-US" dirty="0"/>
           </a:p>
         </p:txBody>
       </p:sp>
@@ -853,7 +855,7 @@
               <a:rPr lang="en-US" smtClean="0"/>
               <a:t>‹#›</a:t>
             </a:fld>
-            <a:endParaRPr lang="en-US"/>
+            <a:endParaRPr lang="en-US" dirty="0"/>
           </a:p>
         </p:txBody>
       </p:sp>
@@ -1055,9 +1057,9 @@
           <a:p>
             <a:fld id="{FCD849ED-D095-4409-898A-E3F8B21476F0}" type="datetimeFigureOut">
               <a:rPr lang="en-US" smtClean="0"/>
-              <a:t>7/26/2011</a:t>
+              <a:t>8/2/2011</a:t>
             </a:fld>
-            <a:endParaRPr lang="en-US"/>
+            <a:endParaRPr lang="en-US" dirty="0"/>
           </a:p>
         </p:txBody>
       </p:sp>
@@ -1076,7 +1078,7 @@
           <a:bodyPr/>
           <a:lstStyle/>
           <a:p>
-            <a:endParaRPr lang="en-US"/>
+            <a:endParaRPr lang="en-US" dirty="0"/>
           </a:p>
         </p:txBody>
       </p:sp>
@@ -1099,7 +1101,7 @@
               <a:rPr lang="en-US" smtClean="0"/>
               <a:t>‹#›</a:t>
             </a:fld>
-            <a:endParaRPr lang="en-US"/>
+            <a:endParaRPr lang="en-US" dirty="0"/>
           </a:p>
         </p:txBody>
       </p:sp>
@@ -1343,9 +1345,9 @@
           <a:p>
             <a:fld id="{FCD849ED-D095-4409-898A-E3F8B21476F0}" type="datetimeFigureOut">
               <a:rPr lang="en-US" smtClean="0"/>
-              <a:t>7/26/2011</a:t>
+              <a:t>8/2/2011</a:t>
             </a:fld>
-            <a:endParaRPr lang="en-US"/>
+            <a:endParaRPr lang="en-US" dirty="0"/>
           </a:p>
         </p:txBody>
       </p:sp>
@@ -1364,7 +1366,7 @@
           <a:bodyPr/>
           <a:lstStyle/>
           <a:p>
-            <a:endParaRPr lang="en-US"/>
+            <a:endParaRPr lang="en-US" dirty="0"/>
           </a:p>
         </p:txBody>
       </p:sp>
@@ -1387,7 +1389,7 @@
               <a:rPr lang="en-US" smtClean="0"/>
               <a:t>‹#›</a:t>
             </a:fld>
-            <a:endParaRPr lang="en-US"/>
+            <a:endParaRPr lang="en-US" dirty="0"/>
           </a:p>
         </p:txBody>
       </p:sp>
@@ -1765,9 +1767,9 @@
           <a:p>
             <a:fld id="{FCD849ED-D095-4409-898A-E3F8B21476F0}" type="datetimeFigureOut">
               <a:rPr lang="en-US" smtClean="0"/>
-              <a:t>7/26/2011</a:t>
+              <a:t>8/2/2011</a:t>
             </a:fld>
-            <a:endParaRPr lang="en-US"/>
+            <a:endParaRPr lang="en-US" dirty="0"/>
           </a:p>
         </p:txBody>
       </p:sp>
@@ -1786,7 +1788,7 @@
           <a:bodyPr/>
           <a:lstStyle/>
           <a:p>
-            <a:endParaRPr lang="en-US"/>
+            <a:endParaRPr lang="en-US" dirty="0"/>
           </a:p>
         </p:txBody>
       </p:sp>
@@ -1809,7 +1811,7 @@
               <a:rPr lang="en-US" smtClean="0"/>
               <a:t>‹#›</a:t>
             </a:fld>
-            <a:endParaRPr lang="en-US"/>
+            <a:endParaRPr lang="en-US" dirty="0"/>
           </a:p>
         </p:txBody>
       </p:sp>
@@ -1883,9 +1885,9 @@
           <a:p>
             <a:fld id="{FCD849ED-D095-4409-898A-E3F8B21476F0}" type="datetimeFigureOut">
               <a:rPr lang="en-US" smtClean="0"/>
-              <a:t>7/26/2011</a:t>
+              <a:t>8/2/2011</a:t>
             </a:fld>
-            <a:endParaRPr lang="en-US"/>
+            <a:endParaRPr lang="en-US" dirty="0"/>
           </a:p>
         </p:txBody>
       </p:sp>
@@ -1904,7 +1906,7 @@
           <a:bodyPr/>
           <a:lstStyle/>
           <a:p>
-            <a:endParaRPr lang="en-US"/>
+            <a:endParaRPr lang="en-US" dirty="0"/>
           </a:p>
         </p:txBody>
       </p:sp>
@@ -1927,7 +1929,7 @@
               <a:rPr lang="en-US" smtClean="0"/>
               <a:t>‹#›</a:t>
             </a:fld>
-            <a:endParaRPr lang="en-US"/>
+            <a:endParaRPr lang="en-US" dirty="0"/>
           </a:p>
         </p:txBody>
       </p:sp>
@@ -1978,9 +1980,9 @@
           <a:p>
             <a:fld id="{FCD849ED-D095-4409-898A-E3F8B21476F0}" type="datetimeFigureOut">
               <a:rPr lang="en-US" smtClean="0"/>
-              <a:t>7/26/2011</a:t>
+              <a:t>8/2/2011</a:t>
             </a:fld>
-            <a:endParaRPr lang="en-US"/>
+            <a:endParaRPr lang="en-US" dirty="0"/>
           </a:p>
         </p:txBody>
       </p:sp>
@@ -1999,7 +2001,7 @@
           <a:bodyPr/>
           <a:lstStyle/>
           <a:p>
-            <a:endParaRPr lang="en-US"/>
+            <a:endParaRPr lang="en-US" dirty="0"/>
           </a:p>
         </p:txBody>
       </p:sp>
@@ -2022,7 +2024,7 @@
               <a:rPr lang="en-US" smtClean="0"/>
               <a:t>‹#›</a:t>
             </a:fld>
-            <a:endParaRPr lang="en-US"/>
+            <a:endParaRPr lang="en-US" dirty="0"/>
           </a:p>
         </p:txBody>
       </p:sp>
@@ -2255,9 +2257,9 @@
           <a:p>
             <a:fld id="{FCD849ED-D095-4409-898A-E3F8B21476F0}" type="datetimeFigureOut">
               <a:rPr lang="en-US" smtClean="0"/>
-              <a:t>7/26/2011</a:t>
+              <a:t>8/2/2011</a:t>
             </a:fld>
-            <a:endParaRPr lang="en-US"/>
+            <a:endParaRPr lang="en-US" dirty="0"/>
           </a:p>
         </p:txBody>
       </p:sp>
@@ -2276,7 +2278,7 @@
           <a:bodyPr/>
           <a:lstStyle/>
           <a:p>
-            <a:endParaRPr lang="en-US"/>
+            <a:endParaRPr lang="en-US" dirty="0"/>
           </a:p>
         </p:txBody>
       </p:sp>
@@ -2299,7 +2301,7 @@
               <a:rPr lang="en-US" smtClean="0"/>
               <a:t>‹#›</a:t>
             </a:fld>
-            <a:endParaRPr lang="en-US"/>
+            <a:endParaRPr lang="en-US" dirty="0"/>
           </a:p>
         </p:txBody>
       </p:sp>
@@ -2422,7 +2424,7 @@
             </a:lvl9pPr>
           </a:lstStyle>
           <a:p>
-            <a:endParaRPr lang="en-US"/>
+            <a:endParaRPr lang="en-US" dirty="0"/>
           </a:p>
         </p:txBody>
       </p:sp>
@@ -2508,9 +2510,9 @@
           <a:p>
             <a:fld id="{FCD849ED-D095-4409-898A-E3F8B21476F0}" type="datetimeFigureOut">
               <a:rPr lang="en-US" smtClean="0"/>
-              <a:t>7/26/2011</a:t>
+              <a:t>8/2/2011</a:t>
             </a:fld>
-            <a:endParaRPr lang="en-US"/>
+            <a:endParaRPr lang="en-US" dirty="0"/>
           </a:p>
         </p:txBody>
       </p:sp>
@@ -2529,7 +2531,7 @@
           <a:bodyPr/>
           <a:lstStyle/>
           <a:p>
-            <a:endParaRPr lang="en-US"/>
+            <a:endParaRPr lang="en-US" dirty="0"/>
           </a:p>
         </p:txBody>
       </p:sp>
@@ -2552,7 +2554,7 @@
               <a:rPr lang="en-US" smtClean="0"/>
               <a:t>‹#›</a:t>
             </a:fld>
-            <a:endParaRPr lang="en-US"/>
+            <a:endParaRPr lang="en-US" dirty="0"/>
           </a:p>
         </p:txBody>
       </p:sp>
@@ -2721,9 +2723,9 @@
           <a:p>
             <a:fld id="{FCD849ED-D095-4409-898A-E3F8B21476F0}" type="datetimeFigureOut">
               <a:rPr lang="en-US" smtClean="0"/>
-              <a:t>7/26/2011</a:t>
+              <a:t>8/2/2011</a:t>
             </a:fld>
-            <a:endParaRPr lang="en-US"/>
+            <a:endParaRPr lang="en-US" dirty="0"/>
           </a:p>
         </p:txBody>
       </p:sp>
@@ -2760,7 +2762,7 @@
             </a:lvl1pPr>
           </a:lstStyle>
           <a:p>
-            <a:endParaRPr lang="en-US"/>
+            <a:endParaRPr lang="en-US" dirty="0"/>
           </a:p>
         </p:txBody>
       </p:sp>
@@ -2801,7 +2803,7 @@
               <a:rPr lang="en-US" smtClean="0"/>
               <a:t>‹#›</a:t>
             </a:fld>
-            <a:endParaRPr lang="en-US"/>
+            <a:endParaRPr lang="en-US" dirty="0"/>
           </a:p>
         </p:txBody>
       </p:sp>
@@ -3414,6 +3416,670 @@
       </p:grpSpPr>
       <p:sp>
         <p:nvSpPr>
+          <p:cNvPr id="12" name="Content Placeholder 2"/>
+          <p:cNvSpPr>
+            <a:spLocks noGrp="1"/>
+          </p:cNvSpPr>
+          <p:nvPr>
+            <p:ph idx="1"/>
+          </p:nvPr>
+        </p:nvSpPr>
+        <p:spPr>
+          <a:xfrm>
+            <a:off x="1447800" y="381000"/>
+            <a:ext cx="7181840" cy="715963"/>
+          </a:xfrm>
+        </p:spPr>
+        <p:txBody>
+          <a:bodyPr>
+            <a:normAutofit/>
+          </a:bodyPr>
+          <a:lstStyle/>
+          <a:p>
+            <a:pPr marL="0" indent="0">
+              <a:buNone/>
+            </a:pPr>
+            <a:r>
+              <a:rPr lang="en-US" dirty="0" smtClean="0"/>
+              <a:t>Workspace                          Source Code</a:t>
+            </a:r>
+            <a:endParaRPr lang="en-US" dirty="0"/>
+          </a:p>
+        </p:txBody>
+      </p:sp>
+      <p:sp>
+        <p:nvSpPr>
+          <p:cNvPr id="2" name="Flowchart: Magnetic Disk 1"/>
+          <p:cNvSpPr/>
+          <p:nvPr/>
+        </p:nvSpPr>
+        <p:spPr>
+          <a:xfrm>
+            <a:off x="490255" y="990600"/>
+            <a:ext cx="4050809" cy="2514600"/>
+          </a:xfrm>
+          <a:prstGeom prst="flowChartMagneticDisk">
+            <a:avLst/>
+          </a:prstGeom>
+        </p:spPr>
+        <p:style>
+          <a:lnRef idx="1">
+            <a:schemeClr val="accent1"/>
+          </a:lnRef>
+          <a:fillRef idx="2">
+            <a:schemeClr val="accent1"/>
+          </a:fillRef>
+          <a:effectRef idx="1">
+            <a:schemeClr val="accent1"/>
+          </a:effectRef>
+          <a:fontRef idx="minor">
+            <a:schemeClr val="dk1"/>
+          </a:fontRef>
+        </p:style>
+        <p:txBody>
+          <a:bodyPr rtlCol="0" anchor="ctr"/>
+          <a:lstStyle/>
+          <a:p>
+            <a:pPr algn="ctr"/>
+            <a:r>
+              <a:rPr lang="en-US" dirty="0"/>
+              <a:t>~/</a:t>
+            </a:r>
+            <a:r>
+              <a:rPr lang="en-US" dirty="0" smtClean="0"/>
+              <a:t>CSS/Workspace</a:t>
+            </a:r>
+          </a:p>
+          <a:p>
+            <a:pPr algn="ctr"/>
+            <a:endParaRPr lang="en-US" dirty="0"/>
+          </a:p>
+          <a:p>
+            <a:r>
+              <a:rPr lang="en-US" dirty="0">
+                <a:latin typeface="Courier New" pitchFamily="49" charset="0"/>
+                <a:cs typeface="Courier New" pitchFamily="49" charset="0"/>
+              </a:rPr>
+              <a:t>.metadata</a:t>
+            </a:r>
+            <a:r>
+              <a:rPr lang="en-US" dirty="0" smtClean="0">
+                <a:latin typeface="Courier New" pitchFamily="49" charset="0"/>
+                <a:cs typeface="Courier New" pitchFamily="49" charset="0"/>
+              </a:rPr>
+              <a:t>/</a:t>
+            </a:r>
+          </a:p>
+          <a:p>
+            <a:r>
+              <a:rPr lang="en-US" dirty="0" smtClean="0">
+                <a:latin typeface="Courier New" pitchFamily="49" charset="0"/>
+                <a:cs typeface="Courier New" pitchFamily="49" charset="0"/>
+              </a:rPr>
+              <a:t>  .log</a:t>
+            </a:r>
+          </a:p>
+          <a:p>
+            <a:r>
+              <a:rPr lang="en-US" dirty="0">
+                <a:latin typeface="Courier New" pitchFamily="49" charset="0"/>
+                <a:cs typeface="Courier New" pitchFamily="49" charset="0"/>
+              </a:rPr>
+              <a:t> </a:t>
+            </a:r>
+            <a:r>
+              <a:rPr lang="en-US" dirty="0" smtClean="0">
+                <a:latin typeface="Courier New" pitchFamily="49" charset="0"/>
+                <a:cs typeface="Courier New" pitchFamily="49" charset="0"/>
+              </a:rPr>
+              <a:t> .plugins</a:t>
+            </a:r>
+          </a:p>
+          <a:p>
+            <a:r>
+              <a:rPr lang="en-US" dirty="0">
+                <a:latin typeface="Courier New" pitchFamily="49" charset="0"/>
+                <a:cs typeface="Courier New" pitchFamily="49" charset="0"/>
+              </a:rPr>
+              <a:t> </a:t>
+            </a:r>
+            <a:r>
+              <a:rPr lang="en-US" dirty="0" smtClean="0">
+                <a:latin typeface="Courier New" pitchFamily="49" charset="0"/>
+                <a:cs typeface="Courier New" pitchFamily="49" charset="0"/>
+              </a:rPr>
+              <a:t>   org.eclipse.core.runtime</a:t>
+            </a:r>
+          </a:p>
+          <a:p>
+            <a:r>
+              <a:rPr lang="en-US" dirty="0">
+                <a:latin typeface="Courier New" pitchFamily="49" charset="0"/>
+                <a:cs typeface="Courier New" pitchFamily="49" charset="0"/>
+              </a:rPr>
+              <a:t> </a:t>
+            </a:r>
+            <a:r>
+              <a:rPr lang="en-US" dirty="0" smtClean="0">
+                <a:latin typeface="Courier New" pitchFamily="49" charset="0"/>
+                <a:cs typeface="Courier New" pitchFamily="49" charset="0"/>
+              </a:rPr>
+              <a:t>     .</a:t>
+            </a:r>
+            <a:r>
+              <a:rPr lang="en-US" dirty="0">
+                <a:latin typeface="Courier New" pitchFamily="49" charset="0"/>
+                <a:cs typeface="Courier New" pitchFamily="49" charset="0"/>
+              </a:rPr>
+              <a:t>settings</a:t>
+            </a:r>
+          </a:p>
+          <a:p>
+            <a:pPr algn="ctr"/>
+            <a:endParaRPr lang="en-US" dirty="0"/>
+          </a:p>
+        </p:txBody>
+      </p:sp>
+      <p:sp>
+        <p:nvSpPr>
+          <p:cNvPr id="33" name="Flowchart: Magnetic Disk 32"/>
+          <p:cNvSpPr/>
+          <p:nvPr/>
+        </p:nvSpPr>
+        <p:spPr>
+          <a:xfrm>
+            <a:off x="4743271" y="990600"/>
+            <a:ext cx="4050809" cy="2514600"/>
+          </a:xfrm>
+          <a:prstGeom prst="flowChartMagneticDisk">
+            <a:avLst/>
+          </a:prstGeom>
+        </p:spPr>
+        <p:style>
+          <a:lnRef idx="1">
+            <a:schemeClr val="accent1"/>
+          </a:lnRef>
+          <a:fillRef idx="2">
+            <a:schemeClr val="accent1"/>
+          </a:fillRef>
+          <a:effectRef idx="1">
+            <a:schemeClr val="accent1"/>
+          </a:effectRef>
+          <a:fontRef idx="minor">
+            <a:schemeClr val="dk1"/>
+          </a:fontRef>
+        </p:style>
+        <p:txBody>
+          <a:bodyPr rtlCol="0" anchor="ctr"/>
+          <a:lstStyle/>
+          <a:p>
+            <a:pPr algn="ctr"/>
+            <a:r>
+              <a:rPr lang="en-US" dirty="0"/>
+              <a:t>~/</a:t>
+            </a:r>
+            <a:r>
+              <a:rPr lang="en-US" dirty="0" smtClean="0"/>
+              <a:t>CSS/Sources</a:t>
+            </a:r>
+          </a:p>
+          <a:p>
+            <a:pPr algn="ctr"/>
+            <a:endParaRPr lang="en-US" dirty="0" smtClean="0"/>
+          </a:p>
+          <a:p>
+            <a:r>
+              <a:rPr lang="en-US" dirty="0" smtClean="0">
+                <a:latin typeface="Courier New" pitchFamily="49" charset="0"/>
+                <a:cs typeface="Courier New" pitchFamily="49" charset="0"/>
+              </a:rPr>
+              <a:t>  </a:t>
+            </a:r>
+          </a:p>
+          <a:p>
+            <a:r>
+              <a:rPr lang="en-US" dirty="0">
+                <a:latin typeface="Courier New" pitchFamily="49" charset="0"/>
+                <a:cs typeface="Courier New" pitchFamily="49" charset="0"/>
+              </a:rPr>
+              <a:t> </a:t>
+            </a:r>
+            <a:r>
+              <a:rPr lang="en-US" dirty="0" smtClean="0">
+                <a:latin typeface="Courier New" pitchFamily="49" charset="0"/>
+                <a:cs typeface="Courier New" pitchFamily="49" charset="0"/>
+              </a:rPr>
+              <a:t> </a:t>
+            </a:r>
+            <a:r>
+              <a:rPr lang="en-US" dirty="0" smtClean="0">
+                <a:latin typeface="Courier New" pitchFamily="49" charset="0"/>
+                <a:cs typeface="Courier New" pitchFamily="49" charset="0"/>
+              </a:rPr>
+              <a:t>org.csstudio.diag.probe</a:t>
+            </a:r>
+            <a:r>
+              <a:rPr lang="en-US" dirty="0" smtClean="0">
+                <a:latin typeface="Courier New" pitchFamily="49" charset="0"/>
+                <a:cs typeface="Courier New" pitchFamily="49" charset="0"/>
+              </a:rPr>
+              <a:t>/</a:t>
+            </a:r>
+          </a:p>
+          <a:p>
+            <a:r>
+              <a:rPr lang="en-US" dirty="0">
+                <a:latin typeface="Courier New" pitchFamily="49" charset="0"/>
+                <a:cs typeface="Courier New" pitchFamily="49" charset="0"/>
+              </a:rPr>
+              <a:t> </a:t>
+            </a:r>
+            <a:r>
+              <a:rPr lang="en-US" dirty="0" smtClean="0">
+                <a:latin typeface="Courier New" pitchFamily="49" charset="0"/>
+                <a:cs typeface="Courier New" pitchFamily="49" charset="0"/>
+              </a:rPr>
+              <a:t>   </a:t>
+            </a:r>
+            <a:r>
+              <a:rPr lang="en-US" dirty="0" smtClean="0">
+                <a:latin typeface="Courier New" pitchFamily="49" charset="0"/>
+                <a:cs typeface="Courier New" pitchFamily="49" charset="0"/>
+              </a:rPr>
+              <a:t>src</a:t>
+            </a:r>
+            <a:r>
+              <a:rPr lang="en-US" dirty="0" smtClean="0">
+                <a:latin typeface="Courier New" pitchFamily="49" charset="0"/>
+                <a:cs typeface="Courier New" pitchFamily="49" charset="0"/>
+              </a:rPr>
+              <a:t>/</a:t>
+            </a:r>
+          </a:p>
+          <a:p>
+            <a:r>
+              <a:rPr lang="en-US" dirty="0">
+                <a:latin typeface="Courier New" pitchFamily="49" charset="0"/>
+                <a:cs typeface="Courier New" pitchFamily="49" charset="0"/>
+              </a:rPr>
+              <a:t> </a:t>
+            </a:r>
+            <a:r>
+              <a:rPr lang="en-US" dirty="0" smtClean="0">
+                <a:latin typeface="Courier New" pitchFamily="49" charset="0"/>
+                <a:cs typeface="Courier New" pitchFamily="49" charset="0"/>
+              </a:rPr>
+              <a:t>   plugin.xml</a:t>
+            </a:r>
+          </a:p>
+          <a:p>
+            <a:r>
+              <a:rPr lang="en-US" dirty="0">
+                <a:latin typeface="Courier New" pitchFamily="49" charset="0"/>
+                <a:cs typeface="Courier New" pitchFamily="49" charset="0"/>
+              </a:rPr>
+              <a:t> </a:t>
+            </a:r>
+            <a:r>
+              <a:rPr lang="en-US" dirty="0" smtClean="0">
+                <a:latin typeface="Courier New" pitchFamily="49" charset="0"/>
+                <a:cs typeface="Courier New" pitchFamily="49" charset="0"/>
+              </a:rPr>
+              <a:t>   …</a:t>
+            </a:r>
+            <a:endParaRPr lang="en-US" dirty="0" smtClean="0"/>
+          </a:p>
+          <a:p>
+            <a:endParaRPr lang="en-US" dirty="0"/>
+          </a:p>
+        </p:txBody>
+      </p:sp>
+      <p:sp>
+        <p:nvSpPr>
+          <p:cNvPr id="35" name="Content Placeholder 2"/>
+          <p:cNvSpPr txBox="1">
+            <a:spLocks/>
+          </p:cNvSpPr>
+          <p:nvPr/>
+        </p:nvSpPr>
+        <p:spPr>
+          <a:xfrm>
+            <a:off x="2743200" y="4459010"/>
+            <a:ext cx="762000" cy="715963"/>
+          </a:xfrm>
+          <a:prstGeom prst="rect">
+            <a:avLst/>
+          </a:prstGeom>
+        </p:spPr>
+        <p:txBody>
+          <a:bodyPr vert="horz" lIns="91440" tIns="45720" rIns="91440" bIns="45720" rtlCol="0">
+            <a:normAutofit/>
+          </a:bodyPr>
+          <a:lstStyle>
+            <a:lvl1pPr marL="342900" indent="-342900" algn="l" defTabSz="914400" rtl="0" eaLnBrk="1" latinLnBrk="0" hangingPunct="1">
+              <a:spcBef>
+                <a:spcPct val="20000"/>
+              </a:spcBef>
+              <a:buFont typeface="Arial" pitchFamily="34" charset="0"/>
+              <a:buChar char="•"/>
+              <a:defRPr sz="3200" kern="1200">
+                <a:solidFill>
+                  <a:schemeClr val="tx1"/>
+                </a:solidFill>
+                <a:latin typeface="+mn-lt"/>
+                <a:ea typeface="+mn-ea"/>
+                <a:cs typeface="+mn-cs"/>
+              </a:defRPr>
+            </a:lvl1pPr>
+            <a:lvl2pPr marL="742950" indent="-285750" algn="l" defTabSz="914400" rtl="0" eaLnBrk="1" latinLnBrk="0" hangingPunct="1">
+              <a:spcBef>
+                <a:spcPct val="20000"/>
+              </a:spcBef>
+              <a:buFont typeface="Arial" pitchFamily="34" charset="0"/>
+              <a:buChar char="–"/>
+              <a:defRPr sz="2800" kern="1200">
+                <a:solidFill>
+                  <a:schemeClr val="tx1"/>
+                </a:solidFill>
+                <a:latin typeface="+mn-lt"/>
+                <a:ea typeface="+mn-ea"/>
+                <a:cs typeface="+mn-cs"/>
+              </a:defRPr>
+            </a:lvl2pPr>
+            <a:lvl3pPr marL="1143000" indent="-228600" algn="l" defTabSz="914400" rtl="0" eaLnBrk="1" latinLnBrk="0" hangingPunct="1">
+              <a:spcBef>
+                <a:spcPct val="20000"/>
+              </a:spcBef>
+              <a:buFont typeface="Arial" pitchFamily="34" charset="0"/>
+              <a:buChar char="•"/>
+              <a:defRPr sz="2400" kern="1200">
+                <a:solidFill>
+                  <a:schemeClr val="tx1"/>
+                </a:solidFill>
+                <a:latin typeface="+mn-lt"/>
+                <a:ea typeface="+mn-ea"/>
+                <a:cs typeface="+mn-cs"/>
+              </a:defRPr>
+            </a:lvl3pPr>
+            <a:lvl4pPr marL="1600200" indent="-228600" algn="l" defTabSz="914400" rtl="0" eaLnBrk="1" latinLnBrk="0" hangingPunct="1">
+              <a:spcBef>
+                <a:spcPct val="20000"/>
+              </a:spcBef>
+              <a:buFont typeface="Arial" pitchFamily="34" charset="0"/>
+              <a:buChar char="–"/>
+              <a:defRPr sz="2000" kern="1200">
+                <a:solidFill>
+                  <a:schemeClr val="tx1"/>
+                </a:solidFill>
+                <a:latin typeface="+mn-lt"/>
+                <a:ea typeface="+mn-ea"/>
+                <a:cs typeface="+mn-cs"/>
+              </a:defRPr>
+            </a:lvl4pPr>
+            <a:lvl5pPr marL="2057400" indent="-228600" algn="l" defTabSz="914400" rtl="0" eaLnBrk="1" latinLnBrk="0" hangingPunct="1">
+              <a:spcBef>
+                <a:spcPct val="20000"/>
+              </a:spcBef>
+              <a:buFont typeface="Arial" pitchFamily="34" charset="0"/>
+              <a:buChar char="»"/>
+              <a:defRPr sz="2000" kern="1200">
+                <a:solidFill>
+                  <a:schemeClr val="tx1"/>
+                </a:solidFill>
+                <a:latin typeface="+mn-lt"/>
+                <a:ea typeface="+mn-ea"/>
+                <a:cs typeface="+mn-cs"/>
+              </a:defRPr>
+            </a:lvl5pPr>
+            <a:lvl6pPr marL="2514600" indent="-228600" algn="l" defTabSz="914400" rtl="0" eaLnBrk="1" latinLnBrk="0" hangingPunct="1">
+              <a:spcBef>
+                <a:spcPct val="20000"/>
+              </a:spcBef>
+              <a:buFont typeface="Arial" pitchFamily="34" charset="0"/>
+              <a:buChar char="•"/>
+              <a:defRPr sz="2000" kern="1200">
+                <a:solidFill>
+                  <a:schemeClr val="tx1"/>
+                </a:solidFill>
+                <a:latin typeface="+mn-lt"/>
+                <a:ea typeface="+mn-ea"/>
+                <a:cs typeface="+mn-cs"/>
+              </a:defRPr>
+            </a:lvl6pPr>
+            <a:lvl7pPr marL="2971800" indent="-228600" algn="l" defTabSz="914400" rtl="0" eaLnBrk="1" latinLnBrk="0" hangingPunct="1">
+              <a:spcBef>
+                <a:spcPct val="20000"/>
+              </a:spcBef>
+              <a:buFont typeface="Arial" pitchFamily="34" charset="0"/>
+              <a:buChar char="•"/>
+              <a:defRPr sz="2000" kern="1200">
+                <a:solidFill>
+                  <a:schemeClr val="tx1"/>
+                </a:solidFill>
+                <a:latin typeface="+mn-lt"/>
+                <a:ea typeface="+mn-ea"/>
+                <a:cs typeface="+mn-cs"/>
+              </a:defRPr>
+            </a:lvl7pPr>
+            <a:lvl8pPr marL="3429000" indent="-228600" algn="l" defTabSz="914400" rtl="0" eaLnBrk="1" latinLnBrk="0" hangingPunct="1">
+              <a:spcBef>
+                <a:spcPct val="20000"/>
+              </a:spcBef>
+              <a:buFont typeface="Arial" pitchFamily="34" charset="0"/>
+              <a:buChar char="•"/>
+              <a:defRPr sz="2000" kern="1200">
+                <a:solidFill>
+                  <a:schemeClr val="tx1"/>
+                </a:solidFill>
+                <a:latin typeface="+mn-lt"/>
+                <a:ea typeface="+mn-ea"/>
+                <a:cs typeface="+mn-cs"/>
+              </a:defRPr>
+            </a:lvl8pPr>
+            <a:lvl9pPr marL="3886200" indent="-228600" algn="l" defTabSz="914400" rtl="0" eaLnBrk="1" latinLnBrk="0" hangingPunct="1">
+              <a:spcBef>
+                <a:spcPct val="20000"/>
+              </a:spcBef>
+              <a:buFont typeface="Arial" pitchFamily="34" charset="0"/>
+              <a:buChar char="•"/>
+              <a:defRPr sz="2000" kern="1200">
+                <a:solidFill>
+                  <a:schemeClr val="tx1"/>
+                </a:solidFill>
+                <a:latin typeface="+mn-lt"/>
+                <a:ea typeface="+mn-ea"/>
+                <a:cs typeface="+mn-cs"/>
+              </a:defRPr>
+            </a:lvl9pPr>
+          </a:lstStyle>
+          <a:p>
+            <a:pPr marL="0" indent="0">
+              <a:buFont typeface="Arial" pitchFamily="34" charset="0"/>
+              <a:buNone/>
+            </a:pPr>
+            <a:r>
+              <a:rPr lang="en-US" dirty="0" smtClean="0"/>
+              <a:t>IDE</a:t>
+            </a:r>
+            <a:endParaRPr lang="en-US" dirty="0"/>
+          </a:p>
+        </p:txBody>
+      </p:sp>
+      <p:cxnSp>
+        <p:nvCxnSpPr>
+          <p:cNvPr id="37" name="Elbow Connector 36"/>
+          <p:cNvCxnSpPr>
+            <a:stCxn id="2" idx="3"/>
+          </p:cNvCxnSpPr>
+          <p:nvPr/>
+        </p:nvCxnSpPr>
+        <p:spPr>
+          <a:xfrm rot="16200000" flipH="1">
+            <a:off x="2623902" y="3396958"/>
+            <a:ext cx="925459" cy="1141942"/>
+          </a:xfrm>
+          <a:prstGeom prst="bentConnector2">
+            <a:avLst/>
+          </a:prstGeom>
+          <a:ln>
+            <a:prstDash val="sysDash"/>
+            <a:tailEnd type="triangle" w="lg" len="lg"/>
+          </a:ln>
+        </p:spPr>
+        <p:style>
+          <a:lnRef idx="2">
+            <a:schemeClr val="accent2"/>
+          </a:lnRef>
+          <a:fillRef idx="0">
+            <a:schemeClr val="accent2"/>
+          </a:fillRef>
+          <a:effectRef idx="1">
+            <a:schemeClr val="accent2"/>
+          </a:effectRef>
+          <a:fontRef idx="minor">
+            <a:schemeClr val="tx1"/>
+          </a:fontRef>
+        </p:style>
+      </p:cxnSp>
+      <p:cxnSp>
+        <p:nvCxnSpPr>
+          <p:cNvPr id="39" name="Elbow Connector 38"/>
+          <p:cNvCxnSpPr>
+            <a:stCxn id="33" idx="3"/>
+          </p:cNvCxnSpPr>
+          <p:nvPr/>
+        </p:nvCxnSpPr>
+        <p:spPr>
+          <a:xfrm rot="5400000">
+            <a:off x="5740340" y="3403664"/>
+            <a:ext cx="926800" cy="1129873"/>
+          </a:xfrm>
+          <a:prstGeom prst="bentConnector2">
+            <a:avLst/>
+          </a:prstGeom>
+          <a:ln>
+            <a:prstDash val="sysDash"/>
+            <a:tailEnd type="triangle" w="lg" len="lg"/>
+          </a:ln>
+        </p:spPr>
+        <p:style>
+          <a:lnRef idx="2">
+            <a:schemeClr val="accent2"/>
+          </a:lnRef>
+          <a:fillRef idx="0">
+            <a:schemeClr val="accent2"/>
+          </a:fillRef>
+          <a:effectRef idx="1">
+            <a:schemeClr val="accent2"/>
+          </a:effectRef>
+          <a:fontRef idx="minor">
+            <a:schemeClr val="tx1"/>
+          </a:fontRef>
+        </p:style>
+      </p:cxnSp>
+      <p:pic>
+        <p:nvPicPr>
+          <p:cNvPr id="1027" name="Picture 3"/>
+          <p:cNvPicPr>
+            <a:picLocks noChangeAspect="1" noChangeArrowheads="1"/>
+          </p:cNvPicPr>
+          <p:nvPr/>
+        </p:nvPicPr>
+        <p:blipFill>
+          <a:blip r:embed="rId2">
+            <a:extLst>
+              <a:ext uri="{28A0092B-C50C-407E-A947-70E740481C1C}">
+                <a14:useLocalDpi xmlns:a14="http://schemas.microsoft.com/office/drawing/2010/main" val="0"/>
+              </a:ext>
+            </a:extLst>
+          </a:blip>
+          <a:srcRect/>
+          <a:stretch>
+            <a:fillRect/>
+          </a:stretch>
+        </p:blipFill>
+        <p:spPr bwMode="auto">
+          <a:xfrm>
+            <a:off x="3637300" y="2971800"/>
+            <a:ext cx="2001503" cy="3513474"/>
+          </a:xfrm>
+          <a:prstGeom prst="rect">
+            <a:avLst/>
+          </a:prstGeom>
+          <a:noFill/>
+          <a:ln>
+            <a:noFill/>
+          </a:ln>
+          <a:effectLst/>
+          <a:extLst>
+            <a:ext uri="{909E8E84-426E-40DD-AFC4-6F175D3DCCD1}">
+              <a14:hiddenFill xmlns:a14="http://schemas.microsoft.com/office/drawing/2010/main">
+                <a:solidFill>
+                  <a:schemeClr val="accent1"/>
+                </a:solidFill>
+              </a14:hiddenFill>
+            </a:ext>
+            <a:ext uri="{91240B29-F687-4F45-9708-019B960494DF}">
+              <a14:hiddenLine xmlns:a14="http://schemas.microsoft.com/office/drawing/2010/main" w="9525">
+                <a:solidFill>
+                  <a:schemeClr val="tx1"/>
+                </a:solidFill>
+                <a:miter lim="800000"/>
+                <a:headEnd/>
+                <a:tailEnd/>
+              </a14:hiddenLine>
+            </a:ext>
+            <a:ext uri="{AF507438-7753-43E0-B8FC-AC1667EBCBE1}">
+              <a14:hiddenEffects xmlns:a14="http://schemas.microsoft.com/office/drawing/2010/main">
+                <a:effectLst>
+                  <a:outerShdw dist="35921" dir="2700000" algn="ctr" rotWithShape="0">
+                    <a:schemeClr val="bg2"/>
+                  </a:outerShdw>
+                </a:effectLst>
+              </a14:hiddenEffects>
+            </a:ext>
+          </a:extLst>
+        </p:spPr>
+      </p:pic>
+    </p:spTree>
+    <p:extLst>
+      <p:ext uri="{BB962C8B-B14F-4D97-AF65-F5344CB8AC3E}">
+        <p14:creationId xmlns:p14="http://schemas.microsoft.com/office/powerpoint/2010/main" val="3509810298"/>
+      </p:ext>
+    </p:extLst>
+  </p:cSld>
+  <p:clrMapOvr>
+    <a:masterClrMapping/>
+  </p:clrMapOvr>
+  <p:timing>
+    <p:tnLst>
+      <p:par>
+        <p:cTn id="1" dur="indefinite" restart="never" nodeType="tmRoot"/>
+      </p:par>
+    </p:tnLst>
+  </p:timing>
+</p:sld>
+</file>
+
+<file path=ppt/slides/slide3.xml><?xml version="1.0" encoding="utf-8"?>
+<p:sld xmlns:a="http://schemas.openxmlformats.org/drawingml/2006/main" xmlns:r="http://schemas.openxmlformats.org/officeDocument/2006/relationships" xmlns:p="http://schemas.openxmlformats.org/presentationml/2006/main">
+  <p:cSld>
+    <p:spTree>
+      <p:nvGrpSpPr>
+        <p:cNvPr id="1" name=""/>
+        <p:cNvGrpSpPr/>
+        <p:nvPr/>
+      </p:nvGrpSpPr>
+      <p:grpSpPr>
+        <a:xfrm>
+          <a:off x="0" y="0"/>
+          <a:ext cx="0" cy="0"/>
+          <a:chOff x="0" y="0"/>
+          <a:chExt cx="0" cy="0"/>
+        </a:xfrm>
+      </p:grpSpPr>
+      <p:sp>
+        <p:nvSpPr>
           <p:cNvPr id="4" name="Cube 3"/>
           <p:cNvSpPr/>
           <p:nvPr/>
@@ -3799,14 +4465,13 @@
             <a:p>
               <a:pPr algn="ctr"/>
               <a:r>
-                <a:rPr lang="en-US" sz="1600" dirty="0" err="1"/>
+                <a:rPr lang="en-US" sz="1600" dirty="0"/>
                 <a:t>o</a:t>
               </a:r>
               <a:r>
-                <a:rPr lang="en-US" sz="1600" dirty="0" err="1" smtClean="0"/>
+                <a:rPr lang="en-US" sz="1600" dirty="0" smtClean="0"/>
                 <a:t>rg.eclipse.core.runtime</a:t>
               </a:r>
-              <a:endParaRPr lang="en-US" sz="1600" dirty="0" smtClean="0"/>
             </a:p>
           </p:txBody>
         </p:sp>
@@ -3973,7 +4638,7 @@
             <a:p>
               <a:pPr algn="ctr"/>
               <a:r>
-                <a:rPr lang="en-US" sz="1600" dirty="0" err="1" smtClean="0"/>
+                <a:rPr lang="en-US" sz="1600" dirty="0" smtClean="0"/>
                 <a:t>org.cs-studio.data</a:t>
               </a:r>
               <a:endParaRPr lang="en-US" sz="1600" dirty="0" smtClean="0"/>
@@ -4112,7 +4777,7 @@
             <a:p>
               <a:pPr algn="ctr"/>
               <a:r>
-                <a:rPr lang="en-US" sz="1600" dirty="0" err="1" smtClean="0"/>
+                <a:rPr lang="en-US" sz="1600" dirty="0" smtClean="0"/>
                 <a:t>org.cs-studio.display.probe</a:t>
               </a:r>
               <a:endParaRPr lang="en-US" sz="1600" dirty="0" smtClean="0"/>
@@ -4526,7 +5191,610 @@
     </p:spTree>
     <p:extLst>
       <p:ext uri="{BB962C8B-B14F-4D97-AF65-F5344CB8AC3E}">
-        <p14:creationId xmlns:p14="http://schemas.microsoft.com/office/powerpoint/2010/main" val="3509810298"/>
+        <p14:creationId xmlns:p14="http://schemas.microsoft.com/office/powerpoint/2010/main" val="1214655037"/>
+      </p:ext>
+    </p:extLst>
+  </p:cSld>
+  <p:clrMapOvr>
+    <a:masterClrMapping/>
+  </p:clrMapOvr>
+  <p:timing>
+    <p:tnLst>
+      <p:par>
+        <p:cTn id="1" dur="indefinite" restart="never" nodeType="tmRoot"/>
+      </p:par>
+    </p:tnLst>
+  </p:timing>
+</p:sld>
+</file>
+
+<file path=ppt/slides/slide4.xml><?xml version="1.0" encoding="utf-8"?>
+<p:sld xmlns:a="http://schemas.openxmlformats.org/drawingml/2006/main" xmlns:r="http://schemas.openxmlformats.org/officeDocument/2006/relationships" xmlns:p="http://schemas.openxmlformats.org/presentationml/2006/main">
+  <p:cSld>
+    <p:spTree>
+      <p:nvGrpSpPr>
+        <p:cNvPr id="1" name=""/>
+        <p:cNvGrpSpPr/>
+        <p:nvPr/>
+      </p:nvGrpSpPr>
+      <p:grpSpPr>
+        <a:xfrm>
+          <a:off x="0" y="0"/>
+          <a:ext cx="0" cy="0"/>
+          <a:chOff x="0" y="0"/>
+          <a:chExt cx="0" cy="0"/>
+        </a:xfrm>
+      </p:grpSpPr>
+      <p:cxnSp>
+        <p:nvCxnSpPr>
+          <p:cNvPr id="37" name="Elbow Connector 36"/>
+          <p:cNvCxnSpPr>
+            <a:stCxn id="13" idx="4"/>
+            <a:endCxn id="2052" idx="1"/>
+          </p:cNvCxnSpPr>
+          <p:nvPr/>
+        </p:nvCxnSpPr>
+        <p:spPr>
+          <a:xfrm>
+            <a:off x="4286070" y="4528905"/>
+            <a:ext cx="729491" cy="3267"/>
+          </a:xfrm>
+          <a:prstGeom prst="straightConnector1">
+            <a:avLst/>
+          </a:prstGeom>
+          <a:ln>
+            <a:prstDash val="sysDash"/>
+            <a:tailEnd type="triangle" w="lg" len="lg"/>
+          </a:ln>
+        </p:spPr>
+        <p:style>
+          <a:lnRef idx="2">
+            <a:schemeClr val="accent2"/>
+          </a:lnRef>
+          <a:fillRef idx="0">
+            <a:schemeClr val="accent2"/>
+          </a:fillRef>
+          <a:effectRef idx="1">
+            <a:schemeClr val="accent2"/>
+          </a:effectRef>
+          <a:fontRef idx="minor">
+            <a:schemeClr val="tx1"/>
+          </a:fontRef>
+        </p:style>
+      </p:cxnSp>
+      <p:cxnSp>
+        <p:nvCxnSpPr>
+          <p:cNvPr id="39" name="Elbow Connector 38"/>
+          <p:cNvCxnSpPr>
+            <a:stCxn id="2051" idx="3"/>
+            <a:endCxn id="9" idx="4"/>
+          </p:cNvCxnSpPr>
+          <p:nvPr/>
+        </p:nvCxnSpPr>
+        <p:spPr>
+          <a:xfrm flipH="1">
+            <a:off x="4020879" y="1314450"/>
+            <a:ext cx="3786428" cy="0"/>
+          </a:xfrm>
+          <a:prstGeom prst="straightConnector1">
+            <a:avLst/>
+          </a:prstGeom>
+          <a:ln>
+            <a:prstDash val="sysDash"/>
+            <a:tailEnd type="triangle" w="lg" len="lg"/>
+          </a:ln>
+        </p:spPr>
+        <p:style>
+          <a:lnRef idx="2">
+            <a:schemeClr val="accent2"/>
+          </a:lnRef>
+          <a:fillRef idx="0">
+            <a:schemeClr val="accent2"/>
+          </a:fillRef>
+          <a:effectRef idx="1">
+            <a:schemeClr val="accent2"/>
+          </a:effectRef>
+          <a:fontRef idx="minor">
+            <a:schemeClr val="tx1"/>
+          </a:fontRef>
+        </p:style>
+      </p:cxnSp>
+      <p:sp>
+        <p:nvSpPr>
+          <p:cNvPr id="9" name="Flowchart: Magnetic Disk 8"/>
+          <p:cNvSpPr/>
+          <p:nvPr/>
+        </p:nvSpPr>
+        <p:spPr>
+          <a:xfrm>
+            <a:off x="363279" y="171450"/>
+            <a:ext cx="3657600" cy="2286000"/>
+          </a:xfrm>
+          <a:prstGeom prst="flowChartMagneticDisk">
+            <a:avLst/>
+          </a:prstGeom>
+        </p:spPr>
+        <p:style>
+          <a:lnRef idx="1">
+            <a:schemeClr val="accent1"/>
+          </a:lnRef>
+          <a:fillRef idx="2">
+            <a:schemeClr val="accent1"/>
+          </a:fillRef>
+          <a:effectRef idx="1">
+            <a:schemeClr val="accent1"/>
+          </a:effectRef>
+          <a:fontRef idx="minor">
+            <a:schemeClr val="dk1"/>
+          </a:fontRef>
+        </p:style>
+        <p:txBody>
+          <a:bodyPr rtlCol="0" anchor="ctr"/>
+          <a:lstStyle/>
+          <a:p>
+            <a:pPr algn="ctr"/>
+            <a:r>
+              <a:rPr lang="en-US" sz="2400" dirty="0" smtClean="0"/>
+              <a:t>Build Directory Layout</a:t>
+            </a:r>
+          </a:p>
+          <a:p>
+            <a:pPr algn="ctr"/>
+            <a:endParaRPr lang="en-US" dirty="0"/>
+          </a:p>
+          <a:p>
+            <a:r>
+              <a:rPr lang="en-US" dirty="0" smtClean="0">
+                <a:latin typeface="Courier New" pitchFamily="49" charset="0"/>
+                <a:cs typeface="Courier New" pitchFamily="49" charset="0"/>
+              </a:rPr>
+              <a:t>features/</a:t>
+            </a:r>
+          </a:p>
+          <a:p>
+            <a:r>
+              <a:rPr lang="en-US" dirty="0">
+                <a:latin typeface="Courier New" pitchFamily="49" charset="0"/>
+                <a:cs typeface="Courier New" pitchFamily="49" charset="0"/>
+              </a:rPr>
+              <a:t> </a:t>
+            </a:r>
+            <a:r>
+              <a:rPr lang="en-US" dirty="0" smtClean="0">
+                <a:latin typeface="Courier New" pitchFamily="49" charset="0"/>
+                <a:cs typeface="Courier New" pitchFamily="49" charset="0"/>
+              </a:rPr>
+              <a:t>  org.csstudio.*.feature</a:t>
+            </a:r>
+          </a:p>
+          <a:p>
+            <a:r>
+              <a:rPr lang="en-US" dirty="0" smtClean="0">
+                <a:latin typeface="Courier New" pitchFamily="49" charset="0"/>
+                <a:cs typeface="Courier New" pitchFamily="49" charset="0"/>
+              </a:rPr>
+              <a:t>plugins/</a:t>
+            </a:r>
+          </a:p>
+          <a:p>
+            <a:r>
+              <a:rPr lang="en-US" dirty="0" smtClean="0">
+                <a:latin typeface="Courier New" pitchFamily="49" charset="0"/>
+                <a:cs typeface="Courier New" pitchFamily="49" charset="0"/>
+              </a:rPr>
+              <a:t>   org.csstudio.*</a:t>
+            </a:r>
+            <a:endParaRPr lang="en-US" dirty="0">
+              <a:latin typeface="Courier New" pitchFamily="49" charset="0"/>
+              <a:cs typeface="Courier New" pitchFamily="49" charset="0"/>
+            </a:endParaRPr>
+          </a:p>
+          <a:p>
+            <a:pPr algn="ctr"/>
+            <a:endParaRPr lang="en-US" dirty="0"/>
+          </a:p>
+        </p:txBody>
+      </p:sp>
+      <p:pic>
+        <p:nvPicPr>
+          <p:cNvPr id="2051" name="Picture 3"/>
+          <p:cNvPicPr>
+            <a:picLocks noChangeAspect="1" noChangeArrowheads="1"/>
+          </p:cNvPicPr>
+          <p:nvPr/>
+        </p:nvPicPr>
+        <p:blipFill>
+          <a:blip r:embed="rId2">
+            <a:extLst>
+              <a:ext uri="{28A0092B-C50C-407E-A947-70E740481C1C}">
+                <a14:useLocalDpi xmlns:a14="http://schemas.microsoft.com/office/drawing/2010/main" val="0"/>
+              </a:ext>
+            </a:extLst>
+          </a:blip>
+          <a:srcRect/>
+          <a:stretch>
+            <a:fillRect/>
+          </a:stretch>
+        </p:blipFill>
+        <p:spPr bwMode="auto">
+          <a:xfrm>
+            <a:off x="5045057" y="381000"/>
+            <a:ext cx="2762250" cy="1866900"/>
+          </a:xfrm>
+          <a:prstGeom prst="rect">
+            <a:avLst/>
+          </a:prstGeom>
+          <a:noFill/>
+          <a:ln>
+            <a:noFill/>
+          </a:ln>
+          <a:effectLst/>
+          <a:extLst>
+            <a:ext uri="{909E8E84-426E-40DD-AFC4-6F175D3DCCD1}">
+              <a14:hiddenFill xmlns:a14="http://schemas.microsoft.com/office/drawing/2010/main">
+                <a:solidFill>
+                  <a:schemeClr val="accent1"/>
+                </a:solidFill>
+              </a14:hiddenFill>
+            </a:ext>
+            <a:ext uri="{91240B29-F687-4F45-9708-019B960494DF}">
+              <a14:hiddenLine xmlns:a14="http://schemas.microsoft.com/office/drawing/2010/main" w="9525">
+                <a:solidFill>
+                  <a:schemeClr val="tx1"/>
+                </a:solidFill>
+                <a:miter lim="800000"/>
+                <a:headEnd/>
+                <a:tailEnd/>
+              </a14:hiddenLine>
+            </a:ext>
+            <a:ext uri="{AF507438-7753-43E0-B8FC-AC1667EBCBE1}">
+              <a14:hiddenEffects xmlns:a14="http://schemas.microsoft.com/office/drawing/2010/main">
+                <a:effectLst>
+                  <a:outerShdw dist="35921" dir="2700000" algn="ctr" rotWithShape="0">
+                    <a:schemeClr val="bg2"/>
+                  </a:outerShdw>
+                </a:effectLst>
+              </a14:hiddenEffects>
+            </a:ext>
+          </a:extLst>
+        </p:spPr>
+      </p:pic>
+      <p:sp>
+        <p:nvSpPr>
+          <p:cNvPr id="13" name="Cube 12"/>
+          <p:cNvSpPr/>
+          <p:nvPr/>
+        </p:nvSpPr>
+        <p:spPr>
+          <a:xfrm>
+            <a:off x="304800" y="3056879"/>
+            <a:ext cx="4038600" cy="2886721"/>
+          </a:xfrm>
+          <a:prstGeom prst="cube">
+            <a:avLst>
+              <a:gd name="adj" fmla="val 1986"/>
+            </a:avLst>
+          </a:prstGeom>
+        </p:spPr>
+        <p:style>
+          <a:lnRef idx="1">
+            <a:schemeClr val="accent1"/>
+          </a:lnRef>
+          <a:fillRef idx="2">
+            <a:schemeClr val="accent1"/>
+          </a:fillRef>
+          <a:effectRef idx="1">
+            <a:schemeClr val="accent1"/>
+          </a:effectRef>
+          <a:fontRef idx="minor">
+            <a:schemeClr val="dk1"/>
+          </a:fontRef>
+        </p:style>
+        <p:txBody>
+          <a:bodyPr rtlCol="0" anchor="ctr"/>
+          <a:lstStyle/>
+          <a:p>
+            <a:pPr algn="ctr"/>
+            <a:r>
+              <a:rPr lang="en-US" sz="2400" dirty="0" smtClean="0"/>
+              <a:t>build.properties</a:t>
+            </a:r>
+            <a:endParaRPr lang="en-US" sz="2400" dirty="0" smtClean="0"/>
+          </a:p>
+          <a:p>
+            <a:pPr algn="ctr"/>
+            <a:endParaRPr lang="en-US" sz="1100" dirty="0" smtClean="0">
+              <a:latin typeface="Courier New" pitchFamily="49" charset="0"/>
+              <a:cs typeface="Courier New" pitchFamily="49" charset="0"/>
+            </a:endParaRPr>
+          </a:p>
+          <a:p>
+            <a:r>
+              <a:rPr lang="en-US" sz="1100" dirty="0">
+                <a:latin typeface="Courier New" pitchFamily="49" charset="0"/>
+                <a:cs typeface="Courier New" pitchFamily="49" charset="0"/>
+              </a:rPr>
+              <a:t># Product to build</a:t>
+            </a:r>
+          </a:p>
+          <a:p>
+            <a:r>
+              <a:rPr lang="en-US" sz="1100" dirty="0">
+                <a:latin typeface="Courier New" pitchFamily="49" charset="0"/>
+                <a:cs typeface="Courier New" pitchFamily="49" charset="0"/>
+              </a:rPr>
+              <a:t>product=/</a:t>
+            </a:r>
+            <a:r>
+              <a:rPr lang="en-US" sz="1100" dirty="0" smtClean="0">
+                <a:latin typeface="Courier New" pitchFamily="49" charset="0"/>
+                <a:cs typeface="Courier New" pitchFamily="49" charset="0"/>
+              </a:rPr>
+              <a:t>org.csstudio.….product/</a:t>
+            </a:r>
+            <a:r>
+              <a:rPr lang="en-US" sz="1100" dirty="0" smtClean="0">
+                <a:latin typeface="Courier New" pitchFamily="49" charset="0"/>
+                <a:cs typeface="Courier New" pitchFamily="49" charset="0"/>
+              </a:rPr>
+              <a:t>css.product</a:t>
+            </a:r>
+            <a:endParaRPr lang="en-US" sz="1100" dirty="0">
+              <a:latin typeface="Courier New" pitchFamily="49" charset="0"/>
+              <a:cs typeface="Courier New" pitchFamily="49" charset="0"/>
+            </a:endParaRPr>
+          </a:p>
+          <a:p>
+            <a:endParaRPr lang="en-US" sz="1100" dirty="0" smtClean="0">
+              <a:latin typeface="Courier New" pitchFamily="49" charset="0"/>
+              <a:cs typeface="Courier New" pitchFamily="49" charset="0"/>
+            </a:endParaRPr>
+          </a:p>
+          <a:p>
+            <a:r>
+              <a:rPr lang="en-US" sz="1100" dirty="0" smtClean="0">
+                <a:latin typeface="Courier New" pitchFamily="49" charset="0"/>
+                <a:cs typeface="Courier New" pitchFamily="49" charset="0"/>
+              </a:rPr>
+              <a:t># </a:t>
+            </a:r>
+            <a:r>
+              <a:rPr lang="en-US" sz="1100" dirty="0">
+                <a:latin typeface="Courier New" pitchFamily="49" charset="0"/>
+                <a:cs typeface="Courier New" pitchFamily="49" charset="0"/>
+              </a:rPr>
+              <a:t>Generate P2 </a:t>
+            </a:r>
+            <a:r>
+              <a:rPr lang="en-US" sz="1100" dirty="0" smtClean="0">
+                <a:latin typeface="Courier New" pitchFamily="49" charset="0"/>
+                <a:cs typeface="Courier New" pitchFamily="49" charset="0"/>
+              </a:rPr>
+              <a:t>repository</a:t>
+            </a:r>
+          </a:p>
+          <a:p>
+            <a:r>
+              <a:rPr lang="en-US" sz="1100" dirty="0" smtClean="0">
+                <a:latin typeface="Courier New" pitchFamily="49" charset="0"/>
+                <a:cs typeface="Courier New" pitchFamily="49" charset="0"/>
+              </a:rPr>
+              <a:t>p2.gathering=true</a:t>
+            </a:r>
+            <a:endParaRPr lang="en-US" sz="1100" dirty="0">
+              <a:latin typeface="Courier New" pitchFamily="49" charset="0"/>
+              <a:cs typeface="Courier New" pitchFamily="49" charset="0"/>
+            </a:endParaRPr>
+          </a:p>
+          <a:p>
+            <a:endParaRPr lang="en-US" sz="1100" dirty="0">
+              <a:latin typeface="Courier New" pitchFamily="49" charset="0"/>
+              <a:cs typeface="Courier New" pitchFamily="49" charset="0"/>
+            </a:endParaRPr>
+          </a:p>
+          <a:p>
+            <a:r>
+              <a:rPr lang="en-US" sz="1100" dirty="0">
+                <a:latin typeface="Courier New" pitchFamily="49" charset="0"/>
+                <a:cs typeface="Courier New" pitchFamily="49" charset="0"/>
+              </a:rPr>
+              <a:t># </a:t>
+            </a:r>
+            <a:r>
+              <a:rPr lang="en-US" sz="1100" dirty="0" smtClean="0">
+                <a:latin typeface="Courier New" pitchFamily="49" charset="0"/>
+                <a:cs typeface="Courier New" pitchFamily="49" charset="0"/>
+              </a:rPr>
+              <a:t>Name of generated archive</a:t>
+            </a:r>
+            <a:endParaRPr lang="en-US" sz="1100" dirty="0">
+              <a:latin typeface="Courier New" pitchFamily="49" charset="0"/>
+              <a:cs typeface="Courier New" pitchFamily="49" charset="0"/>
+            </a:endParaRPr>
+          </a:p>
+          <a:p>
+            <a:r>
+              <a:rPr lang="en-US" sz="1100" dirty="0" smtClean="0">
+                <a:latin typeface="Courier New" pitchFamily="49" charset="0"/>
+                <a:cs typeface="Courier New" pitchFamily="49" charset="0"/>
+              </a:rPr>
+              <a:t>archivePrefix</a:t>
+            </a:r>
+            <a:r>
+              <a:rPr lang="en-US" sz="1100" dirty="0" smtClean="0">
+                <a:latin typeface="Courier New" pitchFamily="49" charset="0"/>
+                <a:cs typeface="Courier New" pitchFamily="49" charset="0"/>
+              </a:rPr>
+              <a:t>=css_3.0</a:t>
+            </a:r>
+          </a:p>
+          <a:p>
+            <a:endParaRPr lang="en-US" sz="1100" dirty="0">
+              <a:latin typeface="Courier New" pitchFamily="49" charset="0"/>
+              <a:cs typeface="Courier New" pitchFamily="49" charset="0"/>
+            </a:endParaRPr>
+          </a:p>
+          <a:p>
+            <a:r>
+              <a:rPr lang="en-US" sz="1100" dirty="0">
+                <a:latin typeface="Courier New" pitchFamily="49" charset="0"/>
+                <a:cs typeface="Courier New" pitchFamily="49" charset="0"/>
+              </a:rPr>
+              <a:t># </a:t>
+            </a:r>
+            <a:r>
+              <a:rPr lang="en-US" sz="1100" dirty="0" smtClean="0">
+                <a:latin typeface="Courier New" pitchFamily="49" charset="0"/>
+                <a:cs typeface="Courier New" pitchFamily="49" charset="0"/>
+              </a:rPr>
+              <a:t>Configurations </a:t>
+            </a:r>
+            <a:r>
+              <a:rPr lang="en-US" sz="1100" dirty="0">
+                <a:latin typeface="Courier New" pitchFamily="49" charset="0"/>
+                <a:cs typeface="Courier New" pitchFamily="49" charset="0"/>
+              </a:rPr>
+              <a:t>to build</a:t>
+            </a:r>
+            <a:r>
+              <a:rPr lang="en-US" sz="1100" dirty="0" smtClean="0">
+                <a:latin typeface="Courier New" pitchFamily="49" charset="0"/>
+                <a:cs typeface="Courier New" pitchFamily="49" charset="0"/>
+              </a:rPr>
+              <a:t>.</a:t>
+            </a:r>
+          </a:p>
+          <a:p>
+            <a:r>
+              <a:rPr lang="en-US" sz="1100" dirty="0" smtClean="0">
+                <a:latin typeface="Courier New" pitchFamily="49" charset="0"/>
+                <a:cs typeface="Courier New" pitchFamily="49" charset="0"/>
+              </a:rPr>
+              <a:t>configs</a:t>
+            </a:r>
+            <a:r>
+              <a:rPr lang="en-US" sz="1100" dirty="0" smtClean="0">
+                <a:latin typeface="Courier New" pitchFamily="49" charset="0"/>
+                <a:cs typeface="Courier New" pitchFamily="49" charset="0"/>
+              </a:rPr>
+              <a:t>=win32,win32,x86  </a:t>
+            </a:r>
+            <a:r>
+              <a:rPr lang="en-US" sz="1100" dirty="0">
+                <a:latin typeface="Courier New" pitchFamily="49" charset="0"/>
+                <a:cs typeface="Courier New" pitchFamily="49" charset="0"/>
+              </a:rPr>
+              <a:t>&amp;  linux,gtk,x86_64</a:t>
+            </a:r>
+          </a:p>
+        </p:txBody>
+      </p:sp>
+      <p:pic>
+        <p:nvPicPr>
+          <p:cNvPr id="2052" name="Picture 4"/>
+          <p:cNvPicPr>
+            <a:picLocks noChangeAspect="1" noChangeArrowheads="1"/>
+          </p:cNvPicPr>
+          <p:nvPr/>
+        </p:nvPicPr>
+        <p:blipFill>
+          <a:blip r:embed="rId3">
+            <a:extLst>
+              <a:ext uri="{28A0092B-C50C-407E-A947-70E740481C1C}">
+                <a14:useLocalDpi xmlns:a14="http://schemas.microsoft.com/office/drawing/2010/main" val="0"/>
+              </a:ext>
+            </a:extLst>
+          </a:blip>
+          <a:srcRect/>
+          <a:stretch>
+            <a:fillRect/>
+          </a:stretch>
+        </p:blipFill>
+        <p:spPr bwMode="auto">
+          <a:xfrm>
+            <a:off x="5015561" y="3912724"/>
+            <a:ext cx="3006388" cy="1238896"/>
+          </a:xfrm>
+          <a:prstGeom prst="rect">
+            <a:avLst/>
+          </a:prstGeom>
+          <a:noFill/>
+          <a:ln>
+            <a:noFill/>
+          </a:ln>
+          <a:effectLst/>
+          <a:extLst>
+            <a:ext uri="{909E8E84-426E-40DD-AFC4-6F175D3DCCD1}">
+              <a14:hiddenFill xmlns:a14="http://schemas.microsoft.com/office/drawing/2010/main">
+                <a:solidFill>
+                  <a:schemeClr val="accent1"/>
+                </a:solidFill>
+              </a14:hiddenFill>
+            </a:ext>
+            <a:ext uri="{91240B29-F687-4F45-9708-019B960494DF}">
+              <a14:hiddenLine xmlns:a14="http://schemas.microsoft.com/office/drawing/2010/main" w="9525">
+                <a:solidFill>
+                  <a:schemeClr val="tx1"/>
+                </a:solidFill>
+                <a:miter lim="800000"/>
+                <a:headEnd/>
+                <a:tailEnd/>
+              </a14:hiddenLine>
+            </a:ext>
+            <a:ext uri="{AF507438-7753-43E0-B8FC-AC1667EBCBE1}">
+              <a14:hiddenEffects xmlns:a14="http://schemas.microsoft.com/office/drawing/2010/main">
+                <a:effectLst>
+                  <a:outerShdw dist="35921" dir="2700000" algn="ctr" rotWithShape="0">
+                    <a:schemeClr val="bg2"/>
+                  </a:outerShdw>
+                </a:effectLst>
+              </a14:hiddenEffects>
+            </a:ext>
+          </a:extLst>
+        </p:spPr>
+      </p:pic>
+      <p:sp>
+        <p:nvSpPr>
+          <p:cNvPr id="34" name="Plus 33"/>
+          <p:cNvSpPr/>
+          <p:nvPr/>
+        </p:nvSpPr>
+        <p:spPr>
+          <a:xfrm>
+            <a:off x="1934980" y="2568847"/>
+            <a:ext cx="574158" cy="411164"/>
+          </a:xfrm>
+          <a:prstGeom prst="mathPlus">
+            <a:avLst/>
+          </a:prstGeom>
+        </p:spPr>
+        <p:style>
+          <a:lnRef idx="3">
+            <a:schemeClr val="lt1"/>
+          </a:lnRef>
+          <a:fillRef idx="1">
+            <a:schemeClr val="accent2"/>
+          </a:fillRef>
+          <a:effectRef idx="1">
+            <a:schemeClr val="accent2"/>
+          </a:effectRef>
+          <a:fontRef idx="minor">
+            <a:schemeClr val="lt1"/>
+          </a:fontRef>
+        </p:style>
+        <p:txBody>
+          <a:bodyPr rtlCol="0" anchor="ctr"/>
+          <a:lstStyle/>
+          <a:p>
+            <a:pPr algn="ctr"/>
+            <a:endParaRPr lang="en-US" dirty="0"/>
+          </a:p>
+        </p:txBody>
+      </p:sp>
+    </p:spTree>
+    <p:extLst>
+      <p:ext uri="{BB962C8B-B14F-4D97-AF65-F5344CB8AC3E}">
+        <p14:creationId xmlns:p14="http://schemas.microsoft.com/office/powerpoint/2010/main" val="214829920"/>
       </p:ext>
     </p:extLst>
   </p:cSld>

</xml_diff>